<commit_message>
Finita la slide con lo schema del C/S in TCP
</commit_message>
<xml_diff>
--- a/Presentazione.pptx
+++ b/Presentazione.pptx
@@ -141,7 +141,7 @@
 <file path=ppt/revisionInfo.xml><?xml version="1.0" encoding="utf-8"?>
 <p1510:revInfo xmlns:a="http://schemas.openxmlformats.org/drawingml/2006/main" xmlns:r="http://schemas.openxmlformats.org/officeDocument/2006/relationships" xmlns:p1510="http://schemas.microsoft.com/office/powerpoint/2015/10/main">
   <p1510:revLst>
-    <p1510:client id="{6C59A853-BA62-4224-9BE1-2DF441724FBD}" v="5" dt="2019-11-04T22:10:40.262"/>
+    <p1510:client id="{6C59A853-BA62-4224-9BE1-2DF441724FBD}" v="26" dt="2019-11-05T16:06:14.082"/>
   </p1510:revLst>
 </p1510:revInfo>
 </file>
@@ -150,8 +150,8 @@
 <pc:chgInfo xmlns:a="http://schemas.openxmlformats.org/drawingml/2006/main" xmlns:r="http://schemas.openxmlformats.org/officeDocument/2006/relationships" xmlns:ac="http://schemas.microsoft.com/office/drawing/2013/main/command" xmlns:pc="http://schemas.microsoft.com/office/powerpoint/2013/main/command">
   <pc:docChgLst>
     <pc:chgData name="Andrei Daniel Ivan" userId="d3c4cde5a19fb9a3" providerId="LiveId" clId="{6C59A853-BA62-4224-9BE1-2DF441724FBD}"/>
-    <pc:docChg chg="undo custSel delSld modSld">
-      <pc:chgData name="Andrei Daniel Ivan" userId="d3c4cde5a19fb9a3" providerId="LiveId" clId="{6C59A853-BA62-4224-9BE1-2DF441724FBD}" dt="2019-11-04T22:11:03.587" v="172" actId="478"/>
+    <pc:docChg chg="undo redo custSel delSld modSld">
+      <pc:chgData name="Andrei Daniel Ivan" userId="d3c4cde5a19fb9a3" providerId="LiveId" clId="{6C59A853-BA62-4224-9BE1-2DF441724FBD}" dt="2019-11-05T16:06:38.516" v="310" actId="1076"/>
       <pc:docMkLst>
         <pc:docMk/>
       </pc:docMkLst>
@@ -281,7 +281,7 @@
         </pc:picChg>
       </pc:sldChg>
       <pc:sldChg chg="addSp delSp modSp">
-        <pc:chgData name="Andrei Daniel Ivan" userId="d3c4cde5a19fb9a3" providerId="LiveId" clId="{6C59A853-BA62-4224-9BE1-2DF441724FBD}" dt="2019-11-04T22:10:52.830" v="168" actId="1076"/>
+        <pc:chgData name="Andrei Daniel Ivan" userId="d3c4cde5a19fb9a3" providerId="LiveId" clId="{6C59A853-BA62-4224-9BE1-2DF441724FBD}" dt="2019-11-05T16:06:38.516" v="310" actId="1076"/>
         <pc:sldMkLst>
           <pc:docMk/>
           <pc:sldMk cId="3577249319" sldId="266"/>
@@ -292,6 +292,14 @@
             <pc:docMk/>
             <pc:sldMk cId="3577249319" sldId="266"/>
             <ac:spMk id="2" creationId="{F1DDE7A4-1A5F-4F0D-B842-7798EDC6EDA8}"/>
+          </ac:spMkLst>
+        </pc:spChg>
+        <pc:spChg chg="add mod">
+          <ac:chgData name="Andrei Daniel Ivan" userId="d3c4cde5a19fb9a3" providerId="LiveId" clId="{6C59A853-BA62-4224-9BE1-2DF441724FBD}" dt="2019-11-05T15:56:46.476" v="182" actId="1076"/>
+          <ac:spMkLst>
+            <pc:docMk/>
+            <pc:sldMk cId="3577249319" sldId="266"/>
+            <ac:spMk id="4" creationId="{51A3EC52-8BD5-4839-8BDB-B3223AA35C2B}"/>
           </ac:spMkLst>
         </pc:spChg>
         <pc:spChg chg="del">
@@ -310,6 +318,22 @@
             <ac:spMk id="7" creationId="{1C544053-6751-4420-A592-2979D732C879}"/>
           </ac:spMkLst>
         </pc:spChg>
+        <pc:spChg chg="add mod">
+          <ac:chgData name="Andrei Daniel Ivan" userId="d3c4cde5a19fb9a3" providerId="LiveId" clId="{6C59A853-BA62-4224-9BE1-2DF441724FBD}" dt="2019-11-05T15:57:59.273" v="193" actId="1076"/>
+          <ac:spMkLst>
+            <pc:docMk/>
+            <pc:sldMk cId="3577249319" sldId="266"/>
+            <ac:spMk id="7" creationId="{9CABD79C-5879-4323-8AFE-AF352F11F398}"/>
+          </ac:spMkLst>
+        </pc:spChg>
+        <pc:spChg chg="add mod">
+          <ac:chgData name="Andrei Daniel Ivan" userId="d3c4cde5a19fb9a3" providerId="LiveId" clId="{6C59A853-BA62-4224-9BE1-2DF441724FBD}" dt="2019-11-05T16:00:07.673" v="215" actId="1076"/>
+          <ac:spMkLst>
+            <pc:docMk/>
+            <pc:sldMk cId="3577249319" sldId="266"/>
+            <ac:spMk id="8" creationId="{BB620DE7-F342-4007-A94F-F75F9A7FAEB8}"/>
+          </ac:spMkLst>
+        </pc:spChg>
         <pc:spChg chg="del">
           <ac:chgData name="Andrei Daniel Ivan" userId="d3c4cde5a19fb9a3" providerId="LiveId" clId="{6C59A853-BA62-4224-9BE1-2DF441724FBD}" dt="2019-11-04T22:09:04.170" v="104" actId="478"/>
           <ac:spMkLst>
@@ -326,12 +350,36 @@
             <ac:spMk id="9" creationId="{24711185-B444-44C2-A328-45964709B321}"/>
           </ac:spMkLst>
         </pc:spChg>
+        <pc:spChg chg="add mod">
+          <ac:chgData name="Andrei Daniel Ivan" userId="d3c4cde5a19fb9a3" providerId="LiveId" clId="{6C59A853-BA62-4224-9BE1-2DF441724FBD}" dt="2019-11-05T16:02:40.282" v="232" actId="1076"/>
+          <ac:spMkLst>
+            <pc:docMk/>
+            <pc:sldMk cId="3577249319" sldId="266"/>
+            <ac:spMk id="9" creationId="{E5EE2DB2-4EE2-405A-B308-F4F6D75A644B}"/>
+          </ac:spMkLst>
+        </pc:spChg>
         <pc:spChg chg="del">
           <ac:chgData name="Andrei Daniel Ivan" userId="d3c4cde5a19fb9a3" providerId="LiveId" clId="{6C59A853-BA62-4224-9BE1-2DF441724FBD}" dt="2019-11-04T22:09:03.059" v="103" actId="478"/>
           <ac:spMkLst>
             <pc:docMk/>
             <pc:sldMk cId="3577249319" sldId="266"/>
             <ac:spMk id="10" creationId="{61234104-F01F-47B7-B03C-74022B0B1521}"/>
+          </ac:spMkLst>
+        </pc:spChg>
+        <pc:spChg chg="add mod">
+          <ac:chgData name="Andrei Daniel Ivan" userId="d3c4cde5a19fb9a3" providerId="LiveId" clId="{6C59A853-BA62-4224-9BE1-2DF441724FBD}" dt="2019-11-05T16:01:17.576" v="221" actId="20577"/>
+          <ac:spMkLst>
+            <pc:docMk/>
+            <pc:sldMk cId="3577249319" sldId="266"/>
+            <ac:spMk id="10" creationId="{D5022A66-B2AA-4F16-BD49-3EC303EB5561}"/>
+          </ac:spMkLst>
+        </pc:spChg>
+        <pc:spChg chg="add mod">
+          <ac:chgData name="Andrei Daniel Ivan" userId="d3c4cde5a19fb9a3" providerId="LiveId" clId="{6C59A853-BA62-4224-9BE1-2DF441724FBD}" dt="2019-11-05T16:02:32.028" v="231" actId="1076"/>
+          <ac:spMkLst>
+            <pc:docMk/>
+            <pc:sldMk cId="3577249319" sldId="266"/>
+            <ac:spMk id="11" creationId="{1A88782D-2F51-42E4-B3AB-3FA41CD21817}"/>
           </ac:spMkLst>
         </pc:spChg>
         <pc:spChg chg="del">
@@ -350,12 +398,36 @@
             <ac:spMk id="13" creationId="{4C5A1219-ABB8-47D2-BDAB-A9F0F8C70AC9}"/>
           </ac:spMkLst>
         </pc:spChg>
+        <pc:spChg chg="add mod">
+          <ac:chgData name="Andrei Daniel Ivan" userId="d3c4cde5a19fb9a3" providerId="LiveId" clId="{6C59A853-BA62-4224-9BE1-2DF441724FBD}" dt="2019-11-05T16:03:02.982" v="234" actId="1076"/>
+          <ac:spMkLst>
+            <pc:docMk/>
+            <pc:sldMk cId="3577249319" sldId="266"/>
+            <ac:spMk id="13" creationId="{6E92212C-F6FA-4226-8FEA-3267D5FE237A}"/>
+          </ac:spMkLst>
+        </pc:spChg>
+        <pc:spChg chg="add mod">
+          <ac:chgData name="Andrei Daniel Ivan" userId="d3c4cde5a19fb9a3" providerId="LiveId" clId="{6C59A853-BA62-4224-9BE1-2DF441724FBD}" dt="2019-11-05T16:03:16.443" v="238" actId="1076"/>
+          <ac:spMkLst>
+            <pc:docMk/>
+            <pc:sldMk cId="3577249319" sldId="266"/>
+            <ac:spMk id="14" creationId="{4560CFF0-24E7-46FB-8EFF-D23E0617F0E6}"/>
+          </ac:spMkLst>
+        </pc:spChg>
         <pc:spChg chg="del">
           <ac:chgData name="Andrei Daniel Ivan" userId="d3c4cde5a19fb9a3" providerId="LiveId" clId="{6C59A853-BA62-4224-9BE1-2DF441724FBD}" dt="2019-11-04T22:09:03.059" v="103" actId="478"/>
           <ac:spMkLst>
             <pc:docMk/>
             <pc:sldMk cId="3577249319" sldId="266"/>
             <ac:spMk id="14" creationId="{57B21165-AA57-479A-9B4F-E49A9465AADB}"/>
+          </ac:spMkLst>
+        </pc:spChg>
+        <pc:spChg chg="add mod">
+          <ac:chgData name="Andrei Daniel Ivan" userId="d3c4cde5a19fb9a3" providerId="LiveId" clId="{6C59A853-BA62-4224-9BE1-2DF441724FBD}" dt="2019-11-05T16:04:21.682" v="252" actId="1076"/>
+          <ac:spMkLst>
+            <pc:docMk/>
+            <pc:sldMk cId="3577249319" sldId="266"/>
+            <ac:spMk id="15" creationId="{7269B5AC-4709-4DFD-844A-DD9F6441DE69}"/>
           </ac:spMkLst>
         </pc:spChg>
         <pc:spChg chg="del">
@@ -374,6 +446,14 @@
             <ac:spMk id="16" creationId="{834E14CA-8869-44A2-9445-EB50B4512A60}"/>
           </ac:spMkLst>
         </pc:spChg>
+        <pc:spChg chg="add mod">
+          <ac:chgData name="Andrei Daniel Ivan" userId="d3c4cde5a19fb9a3" providerId="LiveId" clId="{6C59A853-BA62-4224-9BE1-2DF441724FBD}" dt="2019-11-05T16:05:09.804" v="258" actId="1076"/>
+          <ac:spMkLst>
+            <pc:docMk/>
+            <pc:sldMk cId="3577249319" sldId="266"/>
+            <ac:spMk id="16" creationId="{D543BCD9-4A1D-4EF5-B530-A1AB759C7046}"/>
+          </ac:spMkLst>
+        </pc:spChg>
         <pc:spChg chg="del">
           <ac:chgData name="Andrei Daniel Ivan" userId="d3c4cde5a19fb9a3" providerId="LiveId" clId="{6C59A853-BA62-4224-9BE1-2DF441724FBD}" dt="2019-11-04T22:09:03.059" v="103" actId="478"/>
           <ac:spMkLst>
@@ -382,12 +462,28 @@
             <ac:spMk id="17" creationId="{6DB36EAA-5957-4E6A-9D0B-19335C9E3288}"/>
           </ac:spMkLst>
         </pc:spChg>
+        <pc:spChg chg="add mod">
+          <ac:chgData name="Andrei Daniel Ivan" userId="d3c4cde5a19fb9a3" providerId="LiveId" clId="{6C59A853-BA62-4224-9BE1-2DF441724FBD}" dt="2019-11-05T16:05:26.260" v="263" actId="1076"/>
+          <ac:spMkLst>
+            <pc:docMk/>
+            <pc:sldMk cId="3577249319" sldId="266"/>
+            <ac:spMk id="17" creationId="{75B0951E-69C1-40C7-A3BB-78AB629923A8}"/>
+          </ac:spMkLst>
+        </pc:spChg>
         <pc:spChg chg="del">
           <ac:chgData name="Andrei Daniel Ivan" userId="d3c4cde5a19fb9a3" providerId="LiveId" clId="{6C59A853-BA62-4224-9BE1-2DF441724FBD}" dt="2019-11-04T22:09:03.059" v="103" actId="478"/>
           <ac:spMkLst>
             <pc:docMk/>
             <pc:sldMk cId="3577249319" sldId="266"/>
             <ac:spMk id="18" creationId="{96E91492-0F03-40AE-A92C-AF810161F87B}"/>
+          </ac:spMkLst>
+        </pc:spChg>
+        <pc:spChg chg="add mod">
+          <ac:chgData name="Andrei Daniel Ivan" userId="d3c4cde5a19fb9a3" providerId="LiveId" clId="{6C59A853-BA62-4224-9BE1-2DF441724FBD}" dt="2019-11-05T16:05:34.123" v="265" actId="1076"/>
+          <ac:spMkLst>
+            <pc:docMk/>
+            <pc:sldMk cId="3577249319" sldId="266"/>
+            <ac:spMk id="19" creationId="{07327DF0-1627-4FF9-BCBD-822EAB8833AC}"/>
           </ac:spMkLst>
         </pc:spChg>
         <pc:spChg chg="del">
@@ -406,12 +502,52 @@
             <ac:spMk id="20" creationId="{4589F7B9-92BE-4E30-9687-5A24749B8F60}"/>
           </ac:spMkLst>
         </pc:spChg>
-        <pc:spChg chg="add mod">
-          <ac:chgData name="Andrei Daniel Ivan" userId="d3c4cde5a19fb9a3" providerId="LiveId" clId="{6C59A853-BA62-4224-9BE1-2DF441724FBD}" dt="2019-11-04T22:10:52.830" v="168" actId="1076"/>
+        <pc:spChg chg="add del">
+          <ac:chgData name="Andrei Daniel Ivan" userId="d3c4cde5a19fb9a3" providerId="LiveId" clId="{6C59A853-BA62-4224-9BE1-2DF441724FBD}" dt="2019-11-05T16:05:39.013" v="269"/>
+          <ac:spMkLst>
+            <pc:docMk/>
+            <pc:sldMk cId="3577249319" sldId="266"/>
+            <ac:spMk id="20" creationId="{6BAB5B72-02CA-4E49-B21B-7CB7892B2355}"/>
+          </ac:spMkLst>
+        </pc:spChg>
+        <pc:spChg chg="add del mod">
+          <ac:chgData name="Andrei Daniel Ivan" userId="d3c4cde5a19fb9a3" providerId="LiveId" clId="{6C59A853-BA62-4224-9BE1-2DF441724FBD}" dt="2019-11-05T15:57:03.842" v="192" actId="478"/>
           <ac:spMkLst>
             <pc:docMk/>
             <pc:sldMk cId="3577249319" sldId="266"/>
             <ac:spMk id="21" creationId="{CBD50446-177C-43FD-8B98-E0F420548E64}"/>
+          </ac:spMkLst>
+        </pc:spChg>
+        <pc:spChg chg="add del">
+          <ac:chgData name="Andrei Daniel Ivan" userId="d3c4cde5a19fb9a3" providerId="LiveId" clId="{6C59A853-BA62-4224-9BE1-2DF441724FBD}" dt="2019-11-05T16:05:38.877" v="268"/>
+          <ac:spMkLst>
+            <pc:docMk/>
+            <pc:sldMk cId="3577249319" sldId="266"/>
+            <ac:spMk id="22" creationId="{7D156F76-37AC-46A3-9BB9-50D2DAE10D22}"/>
+          </ac:spMkLst>
+        </pc:spChg>
+        <pc:spChg chg="add mod">
+          <ac:chgData name="Andrei Daniel Ivan" userId="d3c4cde5a19fb9a3" providerId="LiveId" clId="{6C59A853-BA62-4224-9BE1-2DF441724FBD}" dt="2019-11-05T16:05:50.180" v="276" actId="1076"/>
+          <ac:spMkLst>
+            <pc:docMk/>
+            <pc:sldMk cId="3577249319" sldId="266"/>
+            <ac:spMk id="23" creationId="{2CD50850-C29E-40BF-A647-55D9FDDAC81C}"/>
+          </ac:spMkLst>
+        </pc:spChg>
+        <pc:spChg chg="add mod">
+          <ac:chgData name="Andrei Daniel Ivan" userId="d3c4cde5a19fb9a3" providerId="LiveId" clId="{6C59A853-BA62-4224-9BE1-2DF441724FBD}" dt="2019-11-05T16:06:03.652" v="278" actId="1076"/>
+          <ac:spMkLst>
+            <pc:docMk/>
+            <pc:sldMk cId="3577249319" sldId="266"/>
+            <ac:spMk id="24" creationId="{E84EB6BA-73D4-4C32-946A-30172F7647C7}"/>
+          </ac:spMkLst>
+        </pc:spChg>
+        <pc:spChg chg="add mod">
+          <ac:chgData name="Andrei Daniel Ivan" userId="d3c4cde5a19fb9a3" providerId="LiveId" clId="{6C59A853-BA62-4224-9BE1-2DF441724FBD}" dt="2019-11-05T16:06:38.516" v="310" actId="1076"/>
+          <ac:spMkLst>
+            <pc:docMk/>
+            <pc:sldMk cId="3577249319" sldId="266"/>
+            <ac:spMk id="25" creationId="{DEDF7DEB-5A6B-4602-ACFA-67CCC7049A77}"/>
           </ac:spMkLst>
         </pc:spChg>
         <pc:picChg chg="del">
@@ -423,11 +559,19 @@
           </ac:picMkLst>
         </pc:picChg>
         <pc:picChg chg="add mod">
-          <ac:chgData name="Andrei Daniel Ivan" userId="d3c4cde5a19fb9a3" providerId="LiveId" clId="{6C59A853-BA62-4224-9BE1-2DF441724FBD}" dt="2019-11-04T22:10:48.166" v="167" actId="1076"/>
+          <ac:chgData name="Andrei Daniel Ivan" userId="d3c4cde5a19fb9a3" providerId="LiveId" clId="{6C59A853-BA62-4224-9BE1-2DF441724FBD}" dt="2019-11-05T16:03:31.538" v="249" actId="1076"/>
           <ac:picMkLst>
             <pc:docMk/>
             <pc:sldMk cId="3577249319" sldId="266"/>
             <ac:picMk id="12" creationId="{453C418F-5F2B-4AEB-AA99-48DBC2CB23B9}"/>
+          </ac:picMkLst>
+        </pc:picChg>
+        <pc:picChg chg="add del">
+          <ac:chgData name="Andrei Daniel Ivan" userId="d3c4cde5a19fb9a3" providerId="LiveId" clId="{6C59A853-BA62-4224-9BE1-2DF441724FBD}" dt="2019-11-05T16:05:19.036" v="262"/>
+          <ac:picMkLst>
+            <pc:docMk/>
+            <pc:sldMk cId="3577249319" sldId="266"/>
+            <ac:picMk id="18" creationId="{5EFD2DBF-41E7-4BA4-83C0-D1FE384E5642}"/>
           </ac:picMkLst>
         </pc:picChg>
       </pc:sldChg>
@@ -569,7 +713,7 @@
           <a:p>
             <a:fld id="{227EB8F9-9849-4F1B-8247-B2B87148EF6E}" type="datetimeFigureOut">
               <a:rPr lang="it-IT" smtClean="0"/>
-              <a:t>04/11/2019</a:t>
+              <a:t>05/11/2019</a:t>
             </a:fld>
             <a:endParaRPr lang="it-IT"/>
           </a:p>
@@ -967,7 +1111,7 @@
           <a:p>
             <a:fld id="{519C5307-3A56-4F91-8FB2-60E4C7C3FF23}" type="datetime1">
               <a:rPr lang="it-IT" smtClean="0"/>
-              <a:t>04/11/2019</a:t>
+              <a:t>05/11/2019</a:t>
             </a:fld>
             <a:endParaRPr lang="it-IT"/>
           </a:p>
@@ -1138,7 +1282,7 @@
           <a:p>
             <a:fld id="{519C5307-3A56-4F91-8FB2-60E4C7C3FF23}" type="datetime1">
               <a:rPr lang="it-IT" smtClean="0"/>
-              <a:t>04/11/2019</a:t>
+              <a:t>05/11/2019</a:t>
             </a:fld>
             <a:endParaRPr lang="it-IT"/>
           </a:p>
@@ -1319,7 +1463,7 @@
           <a:p>
             <a:fld id="{519C5307-3A56-4F91-8FB2-60E4C7C3FF23}" type="datetime1">
               <a:rPr lang="it-IT" smtClean="0"/>
-              <a:t>04/11/2019</a:t>
+              <a:t>05/11/2019</a:t>
             </a:fld>
             <a:endParaRPr lang="it-IT"/>
           </a:p>
@@ -1490,7 +1634,7 @@
           <a:p>
             <a:fld id="{519C5307-3A56-4F91-8FB2-60E4C7C3FF23}" type="datetime1">
               <a:rPr lang="it-IT" smtClean="0"/>
-              <a:t>04/11/2019</a:t>
+              <a:t>05/11/2019</a:t>
             </a:fld>
             <a:endParaRPr lang="it-IT"/>
           </a:p>
@@ -1737,7 +1881,7 @@
           <a:p>
             <a:fld id="{519C5307-3A56-4F91-8FB2-60E4C7C3FF23}" type="datetime1">
               <a:rPr lang="it-IT" smtClean="0"/>
-              <a:t>04/11/2019</a:t>
+              <a:t>05/11/2019</a:t>
             </a:fld>
             <a:endParaRPr lang="it-IT"/>
           </a:p>
@@ -1970,7 +2114,7 @@
           <a:p>
             <a:fld id="{519C5307-3A56-4F91-8FB2-60E4C7C3FF23}" type="datetime1">
               <a:rPr lang="it-IT" smtClean="0"/>
-              <a:t>04/11/2019</a:t>
+              <a:t>05/11/2019</a:t>
             </a:fld>
             <a:endParaRPr lang="it-IT"/>
           </a:p>
@@ -2338,7 +2482,7 @@
           <a:p>
             <a:fld id="{519C5307-3A56-4F91-8FB2-60E4C7C3FF23}" type="datetime1">
               <a:rPr lang="it-IT" smtClean="0"/>
-              <a:t>04/11/2019</a:t>
+              <a:t>05/11/2019</a:t>
             </a:fld>
             <a:endParaRPr lang="it-IT"/>
           </a:p>
@@ -2457,7 +2601,7 @@
           <a:p>
             <a:fld id="{519C5307-3A56-4F91-8FB2-60E4C7C3FF23}" type="datetime1">
               <a:rPr lang="it-IT" smtClean="0"/>
-              <a:t>04/11/2019</a:t>
+              <a:t>05/11/2019</a:t>
             </a:fld>
             <a:endParaRPr lang="it-IT"/>
           </a:p>
@@ -2553,7 +2697,7 @@
           <a:p>
             <a:fld id="{519C5307-3A56-4F91-8FB2-60E4C7C3FF23}" type="datetime1">
               <a:rPr lang="it-IT" smtClean="0"/>
-              <a:t>04/11/2019</a:t>
+              <a:t>05/11/2019</a:t>
             </a:fld>
             <a:endParaRPr lang="it-IT"/>
           </a:p>
@@ -2831,7 +2975,7 @@
           <a:p>
             <a:fld id="{519C5307-3A56-4F91-8FB2-60E4C7C3FF23}" type="datetime1">
               <a:rPr lang="it-IT" smtClean="0"/>
-              <a:t>04/11/2019</a:t>
+              <a:t>05/11/2019</a:t>
             </a:fld>
             <a:endParaRPr lang="it-IT"/>
           </a:p>
@@ -3089,7 +3233,7 @@
           <a:p>
             <a:fld id="{519C5307-3A56-4F91-8FB2-60E4C7C3FF23}" type="datetime1">
               <a:rPr lang="it-IT" smtClean="0"/>
-              <a:t>04/11/2019</a:t>
+              <a:t>05/11/2019</a:t>
             </a:fld>
             <a:endParaRPr lang="it-IT"/>
           </a:p>
@@ -3303,7 +3447,7 @@
           <a:p>
             <a:fld id="{519C5307-3A56-4F91-8FB2-60E4C7C3FF23}" type="datetime1">
               <a:rPr lang="it-IT" smtClean="0"/>
-              <a:t>04/11/2019</a:t>
+              <a:t>05/11/2019</a:t>
             </a:fld>
             <a:endParaRPr lang="it-IT"/>
           </a:p>
@@ -4566,10 +4710,10 @@
       </p:sp>
       <p:sp>
         <p:nvSpPr>
-          <p:cNvPr id="21" name="CasellaDiTesto 20">
+          <p:cNvPr id="4" name="CasellaDiTesto 3">
             <a:extLst>
               <a:ext uri="{FF2B5EF4-FFF2-40B4-BE49-F238E27FC236}">
-                <a16:creationId xmlns:a16="http://schemas.microsoft.com/office/drawing/2014/main" id="{CBD50446-177C-43FD-8B98-E0F420548E64}"/>
+                <a16:creationId xmlns:a16="http://schemas.microsoft.com/office/drawing/2014/main" id="{51A3EC52-8BD5-4839-8BDB-B3223AA35C2B}"/>
               </a:ext>
             </a:extLst>
           </p:cNvPr>
@@ -4578,8 +4722,8 @@
         </p:nvSpPr>
         <p:spPr>
           <a:xfrm>
-            <a:off x="2567166" y="3244333"/>
-            <a:ext cx="4504631" cy="369332"/>
+            <a:off x="1938867" y="1244601"/>
+            <a:ext cx="800219" cy="369332"/>
           </a:xfrm>
           <a:prstGeom prst="rect">
             <a:avLst/>
@@ -4594,11 +4738,527 @@
           <a:p>
             <a:r>
               <a:rPr lang="it-IT" dirty="0">
-                <a:solidFill>
-                  <a:srgbClr val="00B0F0"/>
-                </a:solidFill>
+                <a:latin typeface="Avenir Next LT Pro Light" panose="020B0304020202020204" pitchFamily="34" charset="0"/>
               </a:rPr>
-              <a:t>Promemoria inserire il testo nelle varie caselle</a:t>
+              <a:t>Client</a:t>
+            </a:r>
+          </a:p>
+        </p:txBody>
+      </p:sp>
+      <p:sp>
+        <p:nvSpPr>
+          <p:cNvPr id="7" name="CasellaDiTesto 6">
+            <a:extLst>
+              <a:ext uri="{FF2B5EF4-FFF2-40B4-BE49-F238E27FC236}">
+                <a16:creationId xmlns:a16="http://schemas.microsoft.com/office/drawing/2014/main" id="{9CABD79C-5879-4323-8AFE-AF352F11F398}"/>
+              </a:ext>
+            </a:extLst>
+          </p:cNvPr>
+          <p:cNvSpPr txBox="1"/>
+          <p:nvPr/>
+        </p:nvSpPr>
+        <p:spPr>
+          <a:xfrm>
+            <a:off x="7632700" y="1244601"/>
+            <a:ext cx="846707" cy="369332"/>
+          </a:xfrm>
+          <a:prstGeom prst="rect">
+            <a:avLst/>
+          </a:prstGeom>
+          <a:noFill/>
+        </p:spPr>
+        <p:txBody>
+          <a:bodyPr wrap="none" rtlCol="0">
+            <a:spAutoFit/>
+          </a:bodyPr>
+          <a:lstStyle/>
+          <a:p>
+            <a:r>
+              <a:rPr lang="it-IT" dirty="0">
+                <a:latin typeface="Avenir Next LT Pro Light" panose="020B0304020202020204" pitchFamily="34" charset="0"/>
+              </a:rPr>
+              <a:t>Server</a:t>
+            </a:r>
+          </a:p>
+        </p:txBody>
+      </p:sp>
+      <p:sp>
+        <p:nvSpPr>
+          <p:cNvPr id="8" name="CasellaDiTesto 7">
+            <a:extLst>
+              <a:ext uri="{FF2B5EF4-FFF2-40B4-BE49-F238E27FC236}">
+                <a16:creationId xmlns:a16="http://schemas.microsoft.com/office/drawing/2014/main" id="{BB620DE7-F342-4007-A94F-F75F9A7FAEB8}"/>
+              </a:ext>
+            </a:extLst>
+          </p:cNvPr>
+          <p:cNvSpPr txBox="1"/>
+          <p:nvPr/>
+        </p:nvSpPr>
+        <p:spPr>
+          <a:xfrm>
+            <a:off x="4649560" y="1306156"/>
+            <a:ext cx="1072666" cy="307777"/>
+          </a:xfrm>
+          <a:prstGeom prst="rect">
+            <a:avLst/>
+          </a:prstGeom>
+          <a:noFill/>
+        </p:spPr>
+        <p:txBody>
+          <a:bodyPr wrap="none" rtlCol="0">
+            <a:spAutoFit/>
+          </a:bodyPr>
+          <a:lstStyle/>
+          <a:p>
+            <a:r>
+              <a:rPr lang="it-IT" sz="1400" dirty="0">
+                <a:latin typeface="Avenir Next LT Pro Light" panose="020B0304020202020204" pitchFamily="34" charset="0"/>
+              </a:rPr>
+              <a:t>Directory 2</a:t>
+            </a:r>
+          </a:p>
+        </p:txBody>
+      </p:sp>
+      <p:sp>
+        <p:nvSpPr>
+          <p:cNvPr id="9" name="CasellaDiTesto 8">
+            <a:extLst>
+              <a:ext uri="{FF2B5EF4-FFF2-40B4-BE49-F238E27FC236}">
+                <a16:creationId xmlns:a16="http://schemas.microsoft.com/office/drawing/2014/main" id="{E5EE2DB2-4EE2-405A-B308-F4F6D75A644B}"/>
+              </a:ext>
+            </a:extLst>
+          </p:cNvPr>
+          <p:cNvSpPr txBox="1"/>
+          <p:nvPr/>
+        </p:nvSpPr>
+        <p:spPr>
+          <a:xfrm>
+            <a:off x="5707392" y="2652354"/>
+            <a:ext cx="1072666" cy="307777"/>
+          </a:xfrm>
+          <a:prstGeom prst="rect">
+            <a:avLst/>
+          </a:prstGeom>
+          <a:noFill/>
+        </p:spPr>
+        <p:txBody>
+          <a:bodyPr wrap="none" rtlCol="0">
+            <a:spAutoFit/>
+          </a:bodyPr>
+          <a:lstStyle/>
+          <a:p>
+            <a:r>
+              <a:rPr lang="it-IT" sz="1400" dirty="0">
+                <a:latin typeface="Avenir Next LT Pro Light" panose="020B0304020202020204" pitchFamily="34" charset="0"/>
+              </a:rPr>
+              <a:t>Directory 1</a:t>
+            </a:r>
+          </a:p>
+        </p:txBody>
+      </p:sp>
+      <p:sp>
+        <p:nvSpPr>
+          <p:cNvPr id="10" name="CasellaDiTesto 9">
+            <a:extLst>
+              <a:ext uri="{FF2B5EF4-FFF2-40B4-BE49-F238E27FC236}">
+                <a16:creationId xmlns:a16="http://schemas.microsoft.com/office/drawing/2014/main" id="{D5022A66-B2AA-4F16-BD49-3EC303EB5561}"/>
+              </a:ext>
+            </a:extLst>
+          </p:cNvPr>
+          <p:cNvSpPr txBox="1"/>
+          <p:nvPr/>
+        </p:nvSpPr>
+        <p:spPr>
+          <a:xfrm>
+            <a:off x="7528619" y="2652355"/>
+            <a:ext cx="1072666" cy="307777"/>
+          </a:xfrm>
+          <a:prstGeom prst="rect">
+            <a:avLst/>
+          </a:prstGeom>
+          <a:noFill/>
+        </p:spPr>
+        <p:txBody>
+          <a:bodyPr wrap="none" rtlCol="0">
+            <a:spAutoFit/>
+          </a:bodyPr>
+          <a:lstStyle/>
+          <a:p>
+            <a:r>
+              <a:rPr lang="it-IT" sz="1400" dirty="0">
+                <a:latin typeface="Avenir Next LT Pro Light" panose="020B0304020202020204" pitchFamily="34" charset="0"/>
+              </a:rPr>
+              <a:t>Directory 2</a:t>
+            </a:r>
+          </a:p>
+        </p:txBody>
+      </p:sp>
+      <p:sp>
+        <p:nvSpPr>
+          <p:cNvPr id="11" name="CasellaDiTesto 10">
+            <a:extLst>
+              <a:ext uri="{FF2B5EF4-FFF2-40B4-BE49-F238E27FC236}">
+                <a16:creationId xmlns:a16="http://schemas.microsoft.com/office/drawing/2014/main" id="{1A88782D-2F51-42E4-B3AB-3FA41CD21817}"/>
+              </a:ext>
+            </a:extLst>
+          </p:cNvPr>
+          <p:cNvSpPr txBox="1"/>
+          <p:nvPr/>
+        </p:nvSpPr>
+        <p:spPr>
+          <a:xfrm>
+            <a:off x="9303855" y="2652355"/>
+            <a:ext cx="1107932" cy="307777"/>
+          </a:xfrm>
+          <a:prstGeom prst="rect">
+            <a:avLst/>
+          </a:prstGeom>
+          <a:noFill/>
+        </p:spPr>
+        <p:txBody>
+          <a:bodyPr wrap="none" rtlCol="0">
+            <a:spAutoFit/>
+          </a:bodyPr>
+          <a:lstStyle/>
+          <a:p>
+            <a:r>
+              <a:rPr lang="it-IT" sz="1400" dirty="0">
+                <a:latin typeface="Avenir Next LT Pro Light" panose="020B0304020202020204" pitchFamily="34" charset="0"/>
+              </a:rPr>
+              <a:t>Directory N</a:t>
+            </a:r>
+          </a:p>
+        </p:txBody>
+      </p:sp>
+      <p:sp>
+        <p:nvSpPr>
+          <p:cNvPr id="13" name="CasellaDiTesto 12">
+            <a:extLst>
+              <a:ext uri="{FF2B5EF4-FFF2-40B4-BE49-F238E27FC236}">
+                <a16:creationId xmlns:a16="http://schemas.microsoft.com/office/drawing/2014/main" id="{6E92212C-F6FA-4226-8FEA-3267D5FE237A}"/>
+              </a:ext>
+            </a:extLst>
+          </p:cNvPr>
+          <p:cNvSpPr txBox="1"/>
+          <p:nvPr/>
+        </p:nvSpPr>
+        <p:spPr>
+          <a:xfrm>
+            <a:off x="5718426" y="4113831"/>
+            <a:ext cx="1072666" cy="307777"/>
+          </a:xfrm>
+          <a:prstGeom prst="rect">
+            <a:avLst/>
+          </a:prstGeom>
+          <a:noFill/>
+        </p:spPr>
+        <p:txBody>
+          <a:bodyPr wrap="none" rtlCol="0">
+            <a:spAutoFit/>
+          </a:bodyPr>
+          <a:lstStyle/>
+          <a:p>
+            <a:r>
+              <a:rPr lang="it-IT" sz="1400" dirty="0">
+                <a:latin typeface="Avenir Next LT Pro Light" panose="020B0304020202020204" pitchFamily="34" charset="0"/>
+              </a:rPr>
+              <a:t>Directory 1</a:t>
+            </a:r>
+          </a:p>
+        </p:txBody>
+      </p:sp>
+      <p:sp>
+        <p:nvSpPr>
+          <p:cNvPr id="14" name="CasellaDiTesto 13">
+            <a:extLst>
+              <a:ext uri="{FF2B5EF4-FFF2-40B4-BE49-F238E27FC236}">
+                <a16:creationId xmlns:a16="http://schemas.microsoft.com/office/drawing/2014/main" id="{4560CFF0-24E7-46FB-8EFF-D23E0617F0E6}"/>
+              </a:ext>
+            </a:extLst>
+          </p:cNvPr>
+          <p:cNvSpPr txBox="1"/>
+          <p:nvPr/>
+        </p:nvSpPr>
+        <p:spPr>
+          <a:xfrm>
+            <a:off x="7519720" y="4113831"/>
+            <a:ext cx="1072666" cy="307777"/>
+          </a:xfrm>
+          <a:prstGeom prst="rect">
+            <a:avLst/>
+          </a:prstGeom>
+          <a:noFill/>
+        </p:spPr>
+        <p:txBody>
+          <a:bodyPr wrap="none" rtlCol="0">
+            <a:spAutoFit/>
+          </a:bodyPr>
+          <a:lstStyle/>
+          <a:p>
+            <a:r>
+              <a:rPr lang="it-IT" sz="1400" dirty="0">
+                <a:latin typeface="Avenir Next LT Pro Light" panose="020B0304020202020204" pitchFamily="34" charset="0"/>
+              </a:rPr>
+              <a:t>Directory 2</a:t>
+            </a:r>
+          </a:p>
+        </p:txBody>
+      </p:sp>
+      <p:sp>
+        <p:nvSpPr>
+          <p:cNvPr id="15" name="CasellaDiTesto 14">
+            <a:extLst>
+              <a:ext uri="{FF2B5EF4-FFF2-40B4-BE49-F238E27FC236}">
+                <a16:creationId xmlns:a16="http://schemas.microsoft.com/office/drawing/2014/main" id="{7269B5AC-4709-4DFD-844A-DD9F6441DE69}"/>
+              </a:ext>
+            </a:extLst>
+          </p:cNvPr>
+          <p:cNvSpPr txBox="1"/>
+          <p:nvPr/>
+        </p:nvSpPr>
+        <p:spPr>
+          <a:xfrm>
+            <a:off x="9622852" y="4118749"/>
+            <a:ext cx="469937" cy="307777"/>
+          </a:xfrm>
+          <a:prstGeom prst="rect">
+            <a:avLst/>
+          </a:prstGeom>
+          <a:noFill/>
+        </p:spPr>
+        <p:txBody>
+          <a:bodyPr wrap="none" rtlCol="0">
+            <a:spAutoFit/>
+          </a:bodyPr>
+          <a:lstStyle/>
+          <a:p>
+            <a:r>
+              <a:rPr lang="it-IT" sz="1400" dirty="0">
+                <a:latin typeface="Avenir Next LT Pro Light" panose="020B0304020202020204" pitchFamily="34" charset="0"/>
+              </a:rPr>
+              <a:t>File</a:t>
+            </a:r>
+          </a:p>
+        </p:txBody>
+      </p:sp>
+      <p:sp>
+        <p:nvSpPr>
+          <p:cNvPr id="16" name="CasellaDiTesto 15">
+            <a:extLst>
+              <a:ext uri="{FF2B5EF4-FFF2-40B4-BE49-F238E27FC236}">
+                <a16:creationId xmlns:a16="http://schemas.microsoft.com/office/drawing/2014/main" id="{D543BCD9-4A1D-4EF5-B530-A1AB759C7046}"/>
+              </a:ext>
+            </a:extLst>
+          </p:cNvPr>
+          <p:cNvSpPr txBox="1"/>
+          <p:nvPr/>
+        </p:nvSpPr>
+        <p:spPr>
+          <a:xfrm>
+            <a:off x="5662829" y="5485915"/>
+            <a:ext cx="473206" cy="307777"/>
+          </a:xfrm>
+          <a:prstGeom prst="rect">
+            <a:avLst/>
+          </a:prstGeom>
+          <a:noFill/>
+        </p:spPr>
+        <p:txBody>
+          <a:bodyPr wrap="none" rtlCol="0">
+            <a:spAutoFit/>
+          </a:bodyPr>
+          <a:lstStyle/>
+          <a:p>
+            <a:r>
+              <a:rPr lang="it-IT" sz="1400" dirty="0">
+                <a:latin typeface="Avenir Next LT Pro Light" panose="020B0304020202020204" pitchFamily="34" charset="0"/>
+              </a:rPr>
+              <a:t>DIR</a:t>
+            </a:r>
+          </a:p>
+        </p:txBody>
+      </p:sp>
+      <p:sp>
+        <p:nvSpPr>
+          <p:cNvPr id="17" name="CasellaDiTesto 16">
+            <a:extLst>
+              <a:ext uri="{FF2B5EF4-FFF2-40B4-BE49-F238E27FC236}">
+                <a16:creationId xmlns:a16="http://schemas.microsoft.com/office/drawing/2014/main" id="{75B0951E-69C1-40C7-A3BB-78AB629923A8}"/>
+              </a:ext>
+            </a:extLst>
+          </p:cNvPr>
+          <p:cNvSpPr txBox="1"/>
+          <p:nvPr/>
+        </p:nvSpPr>
+        <p:spPr>
+          <a:xfrm>
+            <a:off x="7129924" y="5485915"/>
+            <a:ext cx="473206" cy="307777"/>
+          </a:xfrm>
+          <a:prstGeom prst="rect">
+            <a:avLst/>
+          </a:prstGeom>
+          <a:noFill/>
+        </p:spPr>
+        <p:txBody>
+          <a:bodyPr wrap="none" rtlCol="0">
+            <a:spAutoFit/>
+          </a:bodyPr>
+          <a:lstStyle/>
+          <a:p>
+            <a:r>
+              <a:rPr lang="it-IT" sz="1400" dirty="0">
+                <a:latin typeface="Avenir Next LT Pro Light" panose="020B0304020202020204" pitchFamily="34" charset="0"/>
+              </a:rPr>
+              <a:t>DIR</a:t>
+            </a:r>
+          </a:p>
+        </p:txBody>
+      </p:sp>
+      <p:sp>
+        <p:nvSpPr>
+          <p:cNvPr id="19" name="CasellaDiTesto 18">
+            <a:extLst>
+              <a:ext uri="{FF2B5EF4-FFF2-40B4-BE49-F238E27FC236}">
+                <a16:creationId xmlns:a16="http://schemas.microsoft.com/office/drawing/2014/main" id="{07327DF0-1627-4FF9-BCBD-822EAB8833AC}"/>
+              </a:ext>
+            </a:extLst>
+          </p:cNvPr>
+          <p:cNvSpPr txBox="1"/>
+          <p:nvPr/>
+        </p:nvSpPr>
+        <p:spPr>
+          <a:xfrm>
+            <a:off x="8471177" y="5485914"/>
+            <a:ext cx="473206" cy="307777"/>
+          </a:xfrm>
+          <a:prstGeom prst="rect">
+            <a:avLst/>
+          </a:prstGeom>
+          <a:noFill/>
+        </p:spPr>
+        <p:txBody>
+          <a:bodyPr wrap="none" rtlCol="0">
+            <a:spAutoFit/>
+          </a:bodyPr>
+          <a:lstStyle/>
+          <a:p>
+            <a:r>
+              <a:rPr lang="it-IT" sz="1400" dirty="0">
+                <a:latin typeface="Avenir Next LT Pro Light" panose="020B0304020202020204" pitchFamily="34" charset="0"/>
+              </a:rPr>
+              <a:t>DIR</a:t>
+            </a:r>
+          </a:p>
+        </p:txBody>
+      </p:sp>
+      <p:sp>
+        <p:nvSpPr>
+          <p:cNvPr id="23" name="CasellaDiTesto 22">
+            <a:extLst>
+              <a:ext uri="{FF2B5EF4-FFF2-40B4-BE49-F238E27FC236}">
+                <a16:creationId xmlns:a16="http://schemas.microsoft.com/office/drawing/2014/main" id="{2CD50850-C29E-40BF-A647-55D9FDDAC81C}"/>
+              </a:ext>
+            </a:extLst>
+          </p:cNvPr>
+          <p:cNvSpPr txBox="1"/>
+          <p:nvPr/>
+        </p:nvSpPr>
+        <p:spPr>
+          <a:xfrm>
+            <a:off x="6306204" y="5485913"/>
+            <a:ext cx="527709" cy="307777"/>
+          </a:xfrm>
+          <a:prstGeom prst="rect">
+            <a:avLst/>
+          </a:prstGeom>
+          <a:noFill/>
+        </p:spPr>
+        <p:txBody>
+          <a:bodyPr wrap="none" rtlCol="0">
+            <a:spAutoFit/>
+          </a:bodyPr>
+          <a:lstStyle/>
+          <a:p>
+            <a:r>
+              <a:rPr lang="it-IT" sz="1400" dirty="0">
+                <a:latin typeface="Avenir Next LT Pro Light" panose="020B0304020202020204" pitchFamily="34" charset="0"/>
+              </a:rPr>
+              <a:t>FILE</a:t>
+            </a:r>
+          </a:p>
+        </p:txBody>
+      </p:sp>
+      <p:sp>
+        <p:nvSpPr>
+          <p:cNvPr id="24" name="CasellaDiTesto 23">
+            <a:extLst>
+              <a:ext uri="{FF2B5EF4-FFF2-40B4-BE49-F238E27FC236}">
+                <a16:creationId xmlns:a16="http://schemas.microsoft.com/office/drawing/2014/main" id="{E84EB6BA-73D4-4C32-946A-30172F7647C7}"/>
+              </a:ext>
+            </a:extLst>
+          </p:cNvPr>
+          <p:cNvSpPr txBox="1"/>
+          <p:nvPr/>
+        </p:nvSpPr>
+        <p:spPr>
+          <a:xfrm>
+            <a:off x="7773299" y="5485912"/>
+            <a:ext cx="527709" cy="307777"/>
+          </a:xfrm>
+          <a:prstGeom prst="rect">
+            <a:avLst/>
+          </a:prstGeom>
+          <a:noFill/>
+        </p:spPr>
+        <p:txBody>
+          <a:bodyPr wrap="none" rtlCol="0">
+            <a:spAutoFit/>
+          </a:bodyPr>
+          <a:lstStyle/>
+          <a:p>
+            <a:r>
+              <a:rPr lang="it-IT" sz="1400" dirty="0">
+                <a:latin typeface="Avenir Next LT Pro Light" panose="020B0304020202020204" pitchFamily="34" charset="0"/>
+              </a:rPr>
+              <a:t>FILE</a:t>
+            </a:r>
+          </a:p>
+        </p:txBody>
+      </p:sp>
+      <p:sp>
+        <p:nvSpPr>
+          <p:cNvPr id="25" name="CasellaDiTesto 24">
+            <a:extLst>
+              <a:ext uri="{FF2B5EF4-FFF2-40B4-BE49-F238E27FC236}">
+                <a16:creationId xmlns:a16="http://schemas.microsoft.com/office/drawing/2014/main" id="{DEDF7DEB-5A6B-4602-ACFA-67CCC7049A77}"/>
+              </a:ext>
+            </a:extLst>
+          </p:cNvPr>
+          <p:cNvSpPr txBox="1"/>
+          <p:nvPr/>
+        </p:nvSpPr>
+        <p:spPr>
+          <a:xfrm>
+            <a:off x="2815057" y="6202461"/>
+            <a:ext cx="2825902" cy="307777"/>
+          </a:xfrm>
+          <a:prstGeom prst="rect">
+            <a:avLst/>
+          </a:prstGeom>
+          <a:noFill/>
+        </p:spPr>
+        <p:txBody>
+          <a:bodyPr wrap="none" rtlCol="0">
+            <a:spAutoFit/>
+          </a:bodyPr>
+          <a:lstStyle/>
+          <a:p>
+            <a:r>
+              <a:rPr lang="it-IT" sz="1400" dirty="0">
+                <a:latin typeface="Avenir Next LT Pro Light" panose="020B0304020202020204" pitchFamily="34" charset="0"/>
+              </a:rPr>
+              <a:t>NOMI DEI DIRETTORI E DEI FILE</a:t>
             </a:r>
           </a:p>
         </p:txBody>

</xml_diff>